<commit_message>
Den View-Teil der Präsentation hinzugefügt
</commit_message>
<xml_diff>
--- a/documentation/wwmp.pptx
+++ b/documentation/wwmp.pptx
@@ -5,7 +5,7 @@
     <p:sldMasterId id="2147483648" r:id="rId1"/>
   </p:sldMasterIdLst>
   <p:notesMasterIdLst>
-    <p:notesMasterId r:id="rId19"/>
+    <p:notesMasterId r:id="rId23"/>
   </p:notesMasterIdLst>
   <p:sldIdLst>
     <p:sldId id="256" r:id="rId2"/>
@@ -21,10 +21,14 @@
     <p:sldId id="265" r:id="rId12"/>
     <p:sldId id="268" r:id="rId13"/>
     <p:sldId id="269" r:id="rId14"/>
-    <p:sldId id="264" r:id="rId15"/>
-    <p:sldId id="270" r:id="rId16"/>
-    <p:sldId id="271" r:id="rId17"/>
-    <p:sldId id="272" r:id="rId18"/>
+    <p:sldId id="277" r:id="rId15"/>
+    <p:sldId id="264" r:id="rId16"/>
+    <p:sldId id="274" r:id="rId17"/>
+    <p:sldId id="275" r:id="rId18"/>
+    <p:sldId id="276" r:id="rId19"/>
+    <p:sldId id="270" r:id="rId20"/>
+    <p:sldId id="271" r:id="rId21"/>
+    <p:sldId id="272" r:id="rId22"/>
   </p:sldIdLst>
   <p:sldSz cx="12192000" cy="6858000"/>
   <p:notesSz cx="6858000" cy="9144000"/>
@@ -213,7 +217,7 @@
           <a:p>
             <a:fld id="{60D937F9-561B-44D0-9AF2-5F16B33FEB6D}" type="datetimeFigureOut">
               <a:rPr lang="de-DE" smtClean="0"/>
-              <a:t>14.11.2019</a:t>
+              <a:t>19.11.2019</a:t>
             </a:fld>
             <a:endParaRPr lang="de-DE"/>
           </a:p>
@@ -277,38 +281,37 @@
           <a:p>
             <a:pPr lvl="0"/>
             <a:r>
-              <a:rPr lang="de-DE" smtClean="0"/>
+              <a:rPr lang="de-DE"/>
               <a:t>Formatvorlagen des Textmasters bearbeiten</a:t>
             </a:r>
           </a:p>
           <a:p>
             <a:pPr lvl="1"/>
             <a:r>
-              <a:rPr lang="de-DE" smtClean="0"/>
+              <a:rPr lang="de-DE"/>
               <a:t>Zweite Ebene</a:t>
             </a:r>
           </a:p>
           <a:p>
             <a:pPr lvl="2"/>
             <a:r>
-              <a:rPr lang="de-DE" smtClean="0"/>
+              <a:rPr lang="de-DE"/>
               <a:t>Dritte Ebene</a:t>
             </a:r>
           </a:p>
           <a:p>
             <a:pPr lvl="3"/>
             <a:r>
-              <a:rPr lang="de-DE" smtClean="0"/>
+              <a:rPr lang="de-DE"/>
               <a:t>Vierte Ebene</a:t>
             </a:r>
           </a:p>
           <a:p>
             <a:pPr lvl="4"/>
             <a:r>
-              <a:rPr lang="de-DE" smtClean="0"/>
+              <a:rPr lang="de-DE"/>
               <a:t>Fünfte Ebene</a:t>
             </a:r>
-            <a:endParaRPr lang="de-DE"/>
           </a:p>
         </p:txBody>
       </p:sp>
@@ -523,10 +526,9 @@
           </a:lstStyle>
           <a:p>
             <a:r>
-              <a:rPr lang="de-DE" smtClean="0"/>
+              <a:rPr lang="de-DE"/>
               <a:t>Titelmasterformat durch Klicken bearbeiten</a:t>
             </a:r>
-            <a:endParaRPr lang="de-DE"/>
           </a:p>
         </p:txBody>
       </p:sp>
@@ -588,10 +590,9 @@
           </a:lstStyle>
           <a:p>
             <a:r>
-              <a:rPr lang="de-DE" smtClean="0"/>
+              <a:rPr lang="de-DE"/>
               <a:t>Formatvorlage des Untertitelmasters durch Klicken bearbeiten</a:t>
             </a:r>
-            <a:endParaRPr lang="de-DE"/>
           </a:p>
         </p:txBody>
       </p:sp>
@@ -612,7 +613,7 @@
           <a:p>
             <a:fld id="{3B9A3AE3-57FE-428D-8266-94688F93CFE4}" type="datetime1">
               <a:rPr lang="de-DE" smtClean="0"/>
-              <a:t>14.11.2019</a:t>
+              <a:t>19.11.2019</a:t>
             </a:fld>
             <a:endParaRPr lang="de-DE"/>
           </a:p>
@@ -706,10 +707,9 @@
           <a:lstStyle/>
           <a:p>
             <a:r>
-              <a:rPr lang="de-DE" smtClean="0"/>
+              <a:rPr lang="de-DE"/>
               <a:t>Titelmasterformat durch Klicken bearbeiten</a:t>
             </a:r>
-            <a:endParaRPr lang="de-DE"/>
           </a:p>
         </p:txBody>
       </p:sp>
@@ -730,38 +730,37 @@
           <a:p>
             <a:pPr lvl="0"/>
             <a:r>
-              <a:rPr lang="de-DE" smtClean="0"/>
+              <a:rPr lang="de-DE"/>
               <a:t>Formatvorlagen des Textmasters bearbeiten</a:t>
             </a:r>
           </a:p>
           <a:p>
             <a:pPr lvl="1"/>
             <a:r>
-              <a:rPr lang="de-DE" smtClean="0"/>
+              <a:rPr lang="de-DE"/>
               <a:t>Zweite Ebene</a:t>
             </a:r>
           </a:p>
           <a:p>
             <a:pPr lvl="2"/>
             <a:r>
-              <a:rPr lang="de-DE" smtClean="0"/>
+              <a:rPr lang="de-DE"/>
               <a:t>Dritte Ebene</a:t>
             </a:r>
           </a:p>
           <a:p>
             <a:pPr lvl="3"/>
             <a:r>
-              <a:rPr lang="de-DE" smtClean="0"/>
+              <a:rPr lang="de-DE"/>
               <a:t>Vierte Ebene</a:t>
             </a:r>
           </a:p>
           <a:p>
             <a:pPr lvl="4"/>
             <a:r>
-              <a:rPr lang="de-DE" smtClean="0"/>
+              <a:rPr lang="de-DE"/>
               <a:t>Fünfte Ebene</a:t>
             </a:r>
-            <a:endParaRPr lang="de-DE"/>
           </a:p>
         </p:txBody>
       </p:sp>
@@ -782,7 +781,7 @@
           <a:p>
             <a:fld id="{6C31C2C4-7A56-462C-84BA-969744655166}" type="datetime1">
               <a:rPr lang="de-DE" smtClean="0"/>
-              <a:t>14.11.2019</a:t>
+              <a:t>19.11.2019</a:t>
             </a:fld>
             <a:endParaRPr lang="de-DE"/>
           </a:p>
@@ -881,10 +880,9 @@
           <a:lstStyle/>
           <a:p>
             <a:r>
-              <a:rPr lang="de-DE" smtClean="0"/>
+              <a:rPr lang="de-DE"/>
               <a:t>Titelmasterformat durch Klicken bearbeiten</a:t>
             </a:r>
-            <a:endParaRPr lang="de-DE"/>
           </a:p>
         </p:txBody>
       </p:sp>
@@ -910,38 +908,37 @@
           <a:p>
             <a:pPr lvl="0"/>
             <a:r>
-              <a:rPr lang="de-DE" smtClean="0"/>
+              <a:rPr lang="de-DE"/>
               <a:t>Formatvorlagen des Textmasters bearbeiten</a:t>
             </a:r>
           </a:p>
           <a:p>
             <a:pPr lvl="1"/>
             <a:r>
-              <a:rPr lang="de-DE" smtClean="0"/>
+              <a:rPr lang="de-DE"/>
               <a:t>Zweite Ebene</a:t>
             </a:r>
           </a:p>
           <a:p>
             <a:pPr lvl="2"/>
             <a:r>
-              <a:rPr lang="de-DE" smtClean="0"/>
+              <a:rPr lang="de-DE"/>
               <a:t>Dritte Ebene</a:t>
             </a:r>
           </a:p>
           <a:p>
             <a:pPr lvl="3"/>
             <a:r>
-              <a:rPr lang="de-DE" smtClean="0"/>
+              <a:rPr lang="de-DE"/>
               <a:t>Vierte Ebene</a:t>
             </a:r>
           </a:p>
           <a:p>
             <a:pPr lvl="4"/>
             <a:r>
-              <a:rPr lang="de-DE" smtClean="0"/>
+              <a:rPr lang="de-DE"/>
               <a:t>Fünfte Ebene</a:t>
             </a:r>
-            <a:endParaRPr lang="de-DE"/>
           </a:p>
         </p:txBody>
       </p:sp>
@@ -962,7 +959,7 @@
           <a:p>
             <a:fld id="{0360580C-4F5E-4B49-9272-89958F810EDF}" type="datetime1">
               <a:rPr lang="de-DE" smtClean="0"/>
-              <a:t>14.11.2019</a:t>
+              <a:t>19.11.2019</a:t>
             </a:fld>
             <a:endParaRPr lang="de-DE"/>
           </a:p>
@@ -1056,10 +1053,9 @@
           <a:lstStyle/>
           <a:p>
             <a:r>
-              <a:rPr lang="de-DE" smtClean="0"/>
+              <a:rPr lang="de-DE"/>
               <a:t>Titelmasterformat durch Klicken bearbeiten</a:t>
             </a:r>
-            <a:endParaRPr lang="de-DE"/>
           </a:p>
         </p:txBody>
       </p:sp>
@@ -1080,38 +1076,37 @@
           <a:p>
             <a:pPr lvl="0"/>
             <a:r>
-              <a:rPr lang="de-DE" smtClean="0"/>
+              <a:rPr lang="de-DE"/>
               <a:t>Formatvorlagen des Textmasters bearbeiten</a:t>
             </a:r>
           </a:p>
           <a:p>
             <a:pPr lvl="1"/>
             <a:r>
-              <a:rPr lang="de-DE" smtClean="0"/>
+              <a:rPr lang="de-DE"/>
               <a:t>Zweite Ebene</a:t>
             </a:r>
           </a:p>
           <a:p>
             <a:pPr lvl="2"/>
             <a:r>
-              <a:rPr lang="de-DE" smtClean="0"/>
+              <a:rPr lang="de-DE"/>
               <a:t>Dritte Ebene</a:t>
             </a:r>
           </a:p>
           <a:p>
             <a:pPr lvl="3"/>
             <a:r>
-              <a:rPr lang="de-DE" smtClean="0"/>
+              <a:rPr lang="de-DE"/>
               <a:t>Vierte Ebene</a:t>
             </a:r>
           </a:p>
           <a:p>
             <a:pPr lvl="4"/>
             <a:r>
-              <a:rPr lang="de-DE" smtClean="0"/>
+              <a:rPr lang="de-DE"/>
               <a:t>Fünfte Ebene</a:t>
             </a:r>
-            <a:endParaRPr lang="de-DE"/>
           </a:p>
         </p:txBody>
       </p:sp>
@@ -1132,7 +1127,7 @@
           <a:p>
             <a:fld id="{EA428BC3-6769-4E49-A755-91D90E8940AE}" type="datetime1">
               <a:rPr lang="de-DE" smtClean="0"/>
-              <a:t>14.11.2019</a:t>
+              <a:t>19.11.2019</a:t>
             </a:fld>
             <a:endParaRPr lang="de-DE"/>
           </a:p>
@@ -1235,10 +1230,9 @@
           </a:lstStyle>
           <a:p>
             <a:r>
-              <a:rPr lang="de-DE" smtClean="0"/>
+              <a:rPr lang="de-DE"/>
               <a:t>Titelmasterformat durch Klicken bearbeiten</a:t>
             </a:r>
-            <a:endParaRPr lang="de-DE"/>
           </a:p>
         </p:txBody>
       </p:sp>
@@ -1355,7 +1349,7 @@
           <a:p>
             <a:pPr lvl="0"/>
             <a:r>
-              <a:rPr lang="de-DE" smtClean="0"/>
+              <a:rPr lang="de-DE"/>
               <a:t>Formatvorlagen des Textmasters bearbeiten</a:t>
             </a:r>
           </a:p>
@@ -1378,7 +1372,7 @@
           <a:p>
             <a:fld id="{9B8F9CDB-2F59-41E7-A9FB-E2EA88CBC35B}" type="datetime1">
               <a:rPr lang="de-DE" smtClean="0"/>
-              <a:t>14.11.2019</a:t>
+              <a:t>19.11.2019</a:t>
             </a:fld>
             <a:endParaRPr lang="de-DE"/>
           </a:p>
@@ -1472,10 +1466,9 @@
           <a:lstStyle/>
           <a:p>
             <a:r>
-              <a:rPr lang="de-DE" smtClean="0"/>
+              <a:rPr lang="de-DE"/>
               <a:t>Titelmasterformat durch Klicken bearbeiten</a:t>
             </a:r>
-            <a:endParaRPr lang="de-DE"/>
           </a:p>
         </p:txBody>
       </p:sp>
@@ -1501,38 +1494,37 @@
           <a:p>
             <a:pPr lvl="0"/>
             <a:r>
-              <a:rPr lang="de-DE" smtClean="0"/>
+              <a:rPr lang="de-DE"/>
               <a:t>Formatvorlagen des Textmasters bearbeiten</a:t>
             </a:r>
           </a:p>
           <a:p>
             <a:pPr lvl="1"/>
             <a:r>
-              <a:rPr lang="de-DE" smtClean="0"/>
+              <a:rPr lang="de-DE"/>
               <a:t>Zweite Ebene</a:t>
             </a:r>
           </a:p>
           <a:p>
             <a:pPr lvl="2"/>
             <a:r>
-              <a:rPr lang="de-DE" smtClean="0"/>
+              <a:rPr lang="de-DE"/>
               <a:t>Dritte Ebene</a:t>
             </a:r>
           </a:p>
           <a:p>
             <a:pPr lvl="3"/>
             <a:r>
-              <a:rPr lang="de-DE" smtClean="0"/>
+              <a:rPr lang="de-DE"/>
               <a:t>Vierte Ebene</a:t>
             </a:r>
           </a:p>
           <a:p>
             <a:pPr lvl="4"/>
             <a:r>
-              <a:rPr lang="de-DE" smtClean="0"/>
+              <a:rPr lang="de-DE"/>
               <a:t>Fünfte Ebene</a:t>
             </a:r>
-            <a:endParaRPr lang="de-DE"/>
           </a:p>
         </p:txBody>
       </p:sp>
@@ -1558,38 +1550,37 @@
           <a:p>
             <a:pPr lvl="0"/>
             <a:r>
-              <a:rPr lang="de-DE" smtClean="0"/>
+              <a:rPr lang="de-DE"/>
               <a:t>Formatvorlagen des Textmasters bearbeiten</a:t>
             </a:r>
           </a:p>
           <a:p>
             <a:pPr lvl="1"/>
             <a:r>
-              <a:rPr lang="de-DE" smtClean="0"/>
+              <a:rPr lang="de-DE"/>
               <a:t>Zweite Ebene</a:t>
             </a:r>
           </a:p>
           <a:p>
             <a:pPr lvl="2"/>
             <a:r>
-              <a:rPr lang="de-DE" smtClean="0"/>
+              <a:rPr lang="de-DE"/>
               <a:t>Dritte Ebene</a:t>
             </a:r>
           </a:p>
           <a:p>
             <a:pPr lvl="3"/>
             <a:r>
-              <a:rPr lang="de-DE" smtClean="0"/>
+              <a:rPr lang="de-DE"/>
               <a:t>Vierte Ebene</a:t>
             </a:r>
           </a:p>
           <a:p>
             <a:pPr lvl="4"/>
             <a:r>
-              <a:rPr lang="de-DE" smtClean="0"/>
+              <a:rPr lang="de-DE"/>
               <a:t>Fünfte Ebene</a:t>
             </a:r>
-            <a:endParaRPr lang="de-DE"/>
           </a:p>
         </p:txBody>
       </p:sp>
@@ -1610,7 +1601,7 @@
           <a:p>
             <a:fld id="{E4E6BF59-0717-43CF-97D9-ED2E018F2500}" type="datetime1">
               <a:rPr lang="de-DE" smtClean="0"/>
-              <a:t>14.11.2019</a:t>
+              <a:t>19.11.2019</a:t>
             </a:fld>
             <a:endParaRPr lang="de-DE"/>
           </a:p>
@@ -1709,10 +1700,9 @@
           <a:lstStyle/>
           <a:p>
             <a:r>
-              <a:rPr lang="de-DE" smtClean="0"/>
+              <a:rPr lang="de-DE"/>
               <a:t>Titelmasterformat durch Klicken bearbeiten</a:t>
             </a:r>
-            <a:endParaRPr lang="de-DE"/>
           </a:p>
         </p:txBody>
       </p:sp>
@@ -1775,7 +1765,7 @@
           <a:p>
             <a:pPr lvl="0"/>
             <a:r>
-              <a:rPr lang="de-DE" smtClean="0"/>
+              <a:rPr lang="de-DE"/>
               <a:t>Formatvorlagen des Textmasters bearbeiten</a:t>
             </a:r>
           </a:p>
@@ -1803,38 +1793,37 @@
           <a:p>
             <a:pPr lvl="0"/>
             <a:r>
-              <a:rPr lang="de-DE" smtClean="0"/>
+              <a:rPr lang="de-DE"/>
               <a:t>Formatvorlagen des Textmasters bearbeiten</a:t>
             </a:r>
           </a:p>
           <a:p>
             <a:pPr lvl="1"/>
             <a:r>
-              <a:rPr lang="de-DE" smtClean="0"/>
+              <a:rPr lang="de-DE"/>
               <a:t>Zweite Ebene</a:t>
             </a:r>
           </a:p>
           <a:p>
             <a:pPr lvl="2"/>
             <a:r>
-              <a:rPr lang="de-DE" smtClean="0"/>
+              <a:rPr lang="de-DE"/>
               <a:t>Dritte Ebene</a:t>
             </a:r>
           </a:p>
           <a:p>
             <a:pPr lvl="3"/>
             <a:r>
-              <a:rPr lang="de-DE" smtClean="0"/>
+              <a:rPr lang="de-DE"/>
               <a:t>Vierte Ebene</a:t>
             </a:r>
           </a:p>
           <a:p>
             <a:pPr lvl="4"/>
             <a:r>
-              <a:rPr lang="de-DE" smtClean="0"/>
+              <a:rPr lang="de-DE"/>
               <a:t>Fünfte Ebene</a:t>
             </a:r>
-            <a:endParaRPr lang="de-DE"/>
           </a:p>
         </p:txBody>
       </p:sp>
@@ -1897,7 +1886,7 @@
           <a:p>
             <a:pPr lvl="0"/>
             <a:r>
-              <a:rPr lang="de-DE" smtClean="0"/>
+              <a:rPr lang="de-DE"/>
               <a:t>Formatvorlagen des Textmasters bearbeiten</a:t>
             </a:r>
           </a:p>
@@ -1925,38 +1914,37 @@
           <a:p>
             <a:pPr lvl="0"/>
             <a:r>
-              <a:rPr lang="de-DE" smtClean="0"/>
+              <a:rPr lang="de-DE"/>
               <a:t>Formatvorlagen des Textmasters bearbeiten</a:t>
             </a:r>
           </a:p>
           <a:p>
             <a:pPr lvl="1"/>
             <a:r>
-              <a:rPr lang="de-DE" smtClean="0"/>
+              <a:rPr lang="de-DE"/>
               <a:t>Zweite Ebene</a:t>
             </a:r>
           </a:p>
           <a:p>
             <a:pPr lvl="2"/>
             <a:r>
-              <a:rPr lang="de-DE" smtClean="0"/>
+              <a:rPr lang="de-DE"/>
               <a:t>Dritte Ebene</a:t>
             </a:r>
           </a:p>
           <a:p>
             <a:pPr lvl="3"/>
             <a:r>
-              <a:rPr lang="de-DE" smtClean="0"/>
+              <a:rPr lang="de-DE"/>
               <a:t>Vierte Ebene</a:t>
             </a:r>
           </a:p>
           <a:p>
             <a:pPr lvl="4"/>
             <a:r>
-              <a:rPr lang="de-DE" smtClean="0"/>
+              <a:rPr lang="de-DE"/>
               <a:t>Fünfte Ebene</a:t>
             </a:r>
-            <a:endParaRPr lang="de-DE"/>
           </a:p>
         </p:txBody>
       </p:sp>
@@ -1977,7 +1965,7 @@
           <a:p>
             <a:fld id="{05E60D12-505A-45AD-8674-C9373E24576A}" type="datetime1">
               <a:rPr lang="de-DE" smtClean="0"/>
-              <a:t>14.11.2019</a:t>
+              <a:t>19.11.2019</a:t>
             </a:fld>
             <a:endParaRPr lang="de-DE"/>
           </a:p>
@@ -2071,10 +2059,9 @@
           <a:lstStyle/>
           <a:p>
             <a:r>
-              <a:rPr lang="de-DE" smtClean="0"/>
+              <a:rPr lang="de-DE"/>
               <a:t>Titelmasterformat durch Klicken bearbeiten</a:t>
             </a:r>
-            <a:endParaRPr lang="de-DE"/>
           </a:p>
         </p:txBody>
       </p:sp>
@@ -2095,7 +2082,7 @@
           <a:p>
             <a:fld id="{0EE617D4-C464-4C55-9537-5E0842B638DB}" type="datetime1">
               <a:rPr lang="de-DE" smtClean="0"/>
-              <a:t>14.11.2019</a:t>
+              <a:t>19.11.2019</a:t>
             </a:fld>
             <a:endParaRPr lang="de-DE"/>
           </a:p>
@@ -2190,7 +2177,7 @@
           <a:p>
             <a:fld id="{DE3276E5-65CB-4E7C-B048-11C9875E5D78}" type="datetime1">
               <a:rPr lang="de-DE" smtClean="0"/>
-              <a:t>14.11.2019</a:t>
+              <a:t>19.11.2019</a:t>
             </a:fld>
             <a:endParaRPr lang="de-DE"/>
           </a:p>
@@ -2293,10 +2280,9 @@
           </a:lstStyle>
           <a:p>
             <a:r>
-              <a:rPr lang="de-DE" smtClean="0"/>
+              <a:rPr lang="de-DE"/>
               <a:t>Titelmasterformat durch Klicken bearbeiten</a:t>
             </a:r>
-            <a:endParaRPr lang="de-DE"/>
           </a:p>
         </p:txBody>
       </p:sp>
@@ -2350,38 +2336,37 @@
           <a:p>
             <a:pPr lvl="0"/>
             <a:r>
-              <a:rPr lang="de-DE" smtClean="0"/>
+              <a:rPr lang="de-DE"/>
               <a:t>Formatvorlagen des Textmasters bearbeiten</a:t>
             </a:r>
           </a:p>
           <a:p>
             <a:pPr lvl="1"/>
             <a:r>
-              <a:rPr lang="de-DE" smtClean="0"/>
+              <a:rPr lang="de-DE"/>
               <a:t>Zweite Ebene</a:t>
             </a:r>
           </a:p>
           <a:p>
             <a:pPr lvl="2"/>
             <a:r>
-              <a:rPr lang="de-DE" smtClean="0"/>
+              <a:rPr lang="de-DE"/>
               <a:t>Dritte Ebene</a:t>
             </a:r>
           </a:p>
           <a:p>
             <a:pPr lvl="3"/>
             <a:r>
-              <a:rPr lang="de-DE" smtClean="0"/>
+              <a:rPr lang="de-DE"/>
               <a:t>Vierte Ebene</a:t>
             </a:r>
           </a:p>
           <a:p>
             <a:pPr lvl="4"/>
             <a:r>
-              <a:rPr lang="de-DE" smtClean="0"/>
+              <a:rPr lang="de-DE"/>
               <a:t>Fünfte Ebene</a:t>
             </a:r>
-            <a:endParaRPr lang="de-DE"/>
           </a:p>
         </p:txBody>
       </p:sp>
@@ -2444,7 +2429,7 @@
           <a:p>
             <a:pPr lvl="0"/>
             <a:r>
-              <a:rPr lang="de-DE" smtClean="0"/>
+              <a:rPr lang="de-DE"/>
               <a:t>Formatvorlagen des Textmasters bearbeiten</a:t>
             </a:r>
           </a:p>
@@ -2467,7 +2452,7 @@
           <a:p>
             <a:fld id="{6FAC84D1-C2A3-49D9-91BD-34BF6A2E6D3A}" type="datetime1">
               <a:rPr lang="de-DE" smtClean="0"/>
-              <a:t>14.11.2019</a:t>
+              <a:t>19.11.2019</a:t>
             </a:fld>
             <a:endParaRPr lang="de-DE"/>
           </a:p>
@@ -2570,10 +2555,9 @@
           </a:lstStyle>
           <a:p>
             <a:r>
-              <a:rPr lang="de-DE" smtClean="0"/>
+              <a:rPr lang="de-DE"/>
               <a:t>Titelmasterformat durch Klicken bearbeiten</a:t>
             </a:r>
-            <a:endParaRPr lang="de-DE"/>
           </a:p>
         </p:txBody>
       </p:sp>
@@ -2697,7 +2681,7 @@
           <a:p>
             <a:pPr lvl="0"/>
             <a:r>
-              <a:rPr lang="de-DE" smtClean="0"/>
+              <a:rPr lang="de-DE"/>
               <a:t>Formatvorlagen des Textmasters bearbeiten</a:t>
             </a:r>
           </a:p>
@@ -2720,7 +2704,7 @@
           <a:p>
             <a:fld id="{C7C3D48D-46F0-4A96-8F92-410573AE7794}" type="datetime1">
               <a:rPr lang="de-DE" smtClean="0"/>
-              <a:t>14.11.2019</a:t>
+              <a:t>19.11.2019</a:t>
             </a:fld>
             <a:endParaRPr lang="de-DE"/>
           </a:p>
@@ -2829,10 +2813,9 @@
           <a:lstStyle/>
           <a:p>
             <a:r>
-              <a:rPr lang="de-DE" smtClean="0"/>
+              <a:rPr lang="de-DE"/>
               <a:t>Titelmasterformat durch Klicken bearbeiten</a:t>
             </a:r>
-            <a:endParaRPr lang="de-DE"/>
           </a:p>
         </p:txBody>
       </p:sp>
@@ -2863,38 +2846,37 @@
           <a:p>
             <a:pPr lvl="0"/>
             <a:r>
-              <a:rPr lang="de-DE" smtClean="0"/>
+              <a:rPr lang="de-DE"/>
               <a:t>Formatvorlagen des Textmasters bearbeiten</a:t>
             </a:r>
           </a:p>
           <a:p>
             <a:pPr lvl="1"/>
             <a:r>
-              <a:rPr lang="de-DE" smtClean="0"/>
+              <a:rPr lang="de-DE"/>
               <a:t>Zweite Ebene</a:t>
             </a:r>
           </a:p>
           <a:p>
             <a:pPr lvl="2"/>
             <a:r>
-              <a:rPr lang="de-DE" smtClean="0"/>
+              <a:rPr lang="de-DE"/>
               <a:t>Dritte Ebene</a:t>
             </a:r>
           </a:p>
           <a:p>
             <a:pPr lvl="3"/>
             <a:r>
-              <a:rPr lang="de-DE" smtClean="0"/>
+              <a:rPr lang="de-DE"/>
               <a:t>Vierte Ebene</a:t>
             </a:r>
           </a:p>
           <a:p>
             <a:pPr lvl="4"/>
             <a:r>
-              <a:rPr lang="de-DE" smtClean="0"/>
+              <a:rPr lang="de-DE"/>
               <a:t>Fünfte Ebene</a:t>
             </a:r>
-            <a:endParaRPr lang="de-DE"/>
           </a:p>
         </p:txBody>
       </p:sp>
@@ -2933,7 +2915,7 @@
           <a:p>
             <a:fld id="{6055A6E6-0C08-4B3B-9BA3-DF8EF3D0D0E5}" type="datetime1">
               <a:rPr lang="de-DE" smtClean="0"/>
-              <a:t>14.11.2019</a:t>
+              <a:t>19.11.2019</a:t>
             </a:fld>
             <a:endParaRPr lang="de-DE"/>
           </a:p>
@@ -3355,10 +3337,9 @@
           <a:lstStyle/>
           <a:p>
             <a:r>
-              <a:rPr lang="de-DE" dirty="0" smtClean="0"/>
+              <a:rPr lang="de-DE" dirty="0"/>
               <a:t>WWM</a:t>
             </a:r>
-            <a:endParaRPr lang="de-DE" dirty="0"/>
           </a:p>
         </p:txBody>
       </p:sp>
@@ -3404,6 +3385,42 @@
           </a:p>
         </p:txBody>
       </p:sp>
+      <p:pic>
+        <p:nvPicPr>
+          <p:cNvPr id="6" name="Grafik 5">
+            <a:extLst>
+              <a:ext uri="{FF2B5EF4-FFF2-40B4-BE49-F238E27FC236}">
+                <a16:creationId xmlns:a16="http://schemas.microsoft.com/office/drawing/2014/main" id="{0EB6E1FF-A29A-4298-968C-797FFF27D496}"/>
+              </a:ext>
+            </a:extLst>
+          </p:cNvPr>
+          <p:cNvPicPr>
+            <a:picLocks noChangeAspect="1"/>
+          </p:cNvPicPr>
+          <p:nvPr/>
+        </p:nvPicPr>
+        <p:blipFill>
+          <a:blip r:embed="rId2">
+            <a:extLst>
+              <a:ext uri="{28A0092B-C50C-407E-A947-70E740481C1C}">
+                <a14:useLocalDpi xmlns:a14="http://schemas.microsoft.com/office/drawing/2010/main" val="0"/>
+              </a:ext>
+            </a:extLst>
+          </a:blip>
+          <a:stretch>
+            <a:fillRect/>
+          </a:stretch>
+        </p:blipFill>
+        <p:spPr>
+          <a:xfrm>
+            <a:off x="2928495" y="261495"/>
+            <a:ext cx="6335009" cy="6335009"/>
+          </a:xfrm>
+          <a:prstGeom prst="rect">
+            <a:avLst/>
+          </a:prstGeom>
+        </p:spPr>
+      </p:pic>
     </p:spTree>
     <p:extLst>
       <p:ext uri="{BB962C8B-B14F-4D97-AF65-F5344CB8AC3E}">
@@ -3450,10 +3467,9 @@
           <a:lstStyle/>
           <a:p>
             <a:r>
-              <a:rPr lang="de-DE" dirty="0" smtClean="0"/>
+              <a:rPr lang="de-DE" dirty="0"/>
               <a:t>Ausblick</a:t>
             </a:r>
-            <a:endParaRPr lang="de-DE" dirty="0"/>
           </a:p>
         </p:txBody>
       </p:sp>
@@ -3545,10 +3561,9 @@
           <a:lstStyle/>
           <a:p>
             <a:r>
-              <a:rPr lang="de-DE" dirty="0" smtClean="0"/>
+              <a:rPr lang="de-DE" dirty="0"/>
               <a:t>Controller</a:t>
             </a:r>
-            <a:endParaRPr lang="de-DE" dirty="0"/>
           </a:p>
         </p:txBody>
       </p:sp>
@@ -3640,10 +3655,9 @@
           <a:lstStyle/>
           <a:p>
             <a:r>
-              <a:rPr lang="de-DE" dirty="0" smtClean="0"/>
+              <a:rPr lang="de-DE" dirty="0"/>
               <a:t>Was Funktioniert was nicht?</a:t>
             </a:r>
-            <a:endParaRPr lang="de-DE" dirty="0"/>
           </a:p>
         </p:txBody>
       </p:sp>
@@ -3735,10 +3749,9 @@
           <a:lstStyle/>
           <a:p>
             <a:r>
-              <a:rPr lang="de-DE" dirty="0" smtClean="0"/>
+              <a:rPr lang="de-DE" dirty="0"/>
               <a:t>Ausblick</a:t>
             </a:r>
-            <a:endParaRPr lang="de-DE" dirty="0"/>
           </a:p>
         </p:txBody>
       </p:sp>
@@ -3830,29 +3843,9 @@
           <a:lstStyle/>
           <a:p>
             <a:r>
-              <a:rPr lang="de-DE" dirty="0" smtClean="0"/>
+              <a:rPr lang="de-DE" dirty="0"/>
               <a:t>View</a:t>
             </a:r>
-            <a:endParaRPr lang="de-DE" dirty="0"/>
-          </a:p>
-        </p:txBody>
-      </p:sp>
-      <p:sp>
-        <p:nvSpPr>
-          <p:cNvPr id="3" name="Inhaltsplatzhalter 2"/>
-          <p:cNvSpPr>
-            <a:spLocks noGrp="1"/>
-          </p:cNvSpPr>
-          <p:nvPr>
-            <p:ph idx="1"/>
-          </p:nvPr>
-        </p:nvSpPr>
-        <p:spPr/>
-        <p:txBody>
-          <a:bodyPr/>
-          <a:lstStyle/>
-          <a:p>
-            <a:endParaRPr lang="de-DE"/>
           </a:p>
         </p:txBody>
       </p:sp>
@@ -3879,10 +3872,45 @@
           </a:p>
         </p:txBody>
       </p:sp>
+      <p:pic>
+        <p:nvPicPr>
+          <p:cNvPr id="7" name="Inhaltsplatzhalter 6">
+            <a:extLst>
+              <a:ext uri="{FF2B5EF4-FFF2-40B4-BE49-F238E27FC236}">
+                <a16:creationId xmlns:a16="http://schemas.microsoft.com/office/drawing/2014/main" id="{8F07DE71-8738-4F99-8A71-A6AE7F46EFF7}"/>
+              </a:ext>
+            </a:extLst>
+          </p:cNvPr>
+          <p:cNvPicPr>
+            <a:picLocks noGrp="1" noChangeAspect="1"/>
+          </p:cNvPicPr>
+          <p:nvPr>
+            <p:ph idx="1"/>
+          </p:nvPr>
+        </p:nvPicPr>
+        <p:blipFill>
+          <a:blip r:embed="rId2">
+            <a:extLst>
+              <a:ext uri="{28A0092B-C50C-407E-A947-70E740481C1C}">
+                <a14:useLocalDpi xmlns:a14="http://schemas.microsoft.com/office/drawing/2010/main" val="0"/>
+              </a:ext>
+            </a:extLst>
+          </a:blip>
+          <a:stretch>
+            <a:fillRect/>
+          </a:stretch>
+        </p:blipFill>
+        <p:spPr>
+          <a:xfrm>
+            <a:off x="3201131" y="1825625"/>
+            <a:ext cx="5789737" cy="4351338"/>
+          </a:xfrm>
+        </p:spPr>
+      </p:pic>
     </p:spTree>
     <p:extLst>
       <p:ext uri="{BB962C8B-B14F-4D97-AF65-F5344CB8AC3E}">
-        <p14:creationId xmlns:p14="http://schemas.microsoft.com/office/powerpoint/2010/main" val="3067687759"/>
+        <p14:creationId xmlns:p14="http://schemas.microsoft.com/office/powerpoint/2010/main" val="3717256861"/>
       </p:ext>
     </p:extLst>
   </p:cSld>
@@ -3925,33 +3953,9 @@
           <a:lstStyle/>
           <a:p>
             <a:r>
-              <a:rPr lang="de-DE" dirty="0" smtClean="0"/>
-              <a:t>Was </a:t>
-            </a:r>
-            <a:r>
-              <a:rPr lang="de-DE" dirty="0" smtClean="0"/>
-              <a:t>Funktioniert?</a:t>
-            </a:r>
-            <a:endParaRPr lang="de-DE" dirty="0"/>
-          </a:p>
-        </p:txBody>
-      </p:sp>
-      <p:sp>
-        <p:nvSpPr>
-          <p:cNvPr id="3" name="Inhaltsplatzhalter 2"/>
-          <p:cNvSpPr>
-            <a:spLocks noGrp="1"/>
-          </p:cNvSpPr>
-          <p:nvPr>
-            <p:ph idx="1"/>
-          </p:nvPr>
-        </p:nvSpPr>
-        <p:spPr/>
-        <p:txBody>
-          <a:bodyPr/>
-          <a:lstStyle/>
-          <a:p>
-            <a:endParaRPr lang="de-DE" dirty="0"/>
+              <a:rPr lang="de-DE" dirty="0"/>
+              <a:t>View</a:t>
+            </a:r>
           </a:p>
         </p:txBody>
       </p:sp>
@@ -3978,10 +3982,45 @@
           </a:p>
         </p:txBody>
       </p:sp>
+      <p:pic>
+        <p:nvPicPr>
+          <p:cNvPr id="10" name="Inhaltsplatzhalter 9">
+            <a:extLst>
+              <a:ext uri="{FF2B5EF4-FFF2-40B4-BE49-F238E27FC236}">
+                <a16:creationId xmlns:a16="http://schemas.microsoft.com/office/drawing/2014/main" id="{96018443-97D9-4AF2-A43F-61313D1D9889}"/>
+              </a:ext>
+            </a:extLst>
+          </p:cNvPr>
+          <p:cNvPicPr>
+            <a:picLocks noGrp="1" noChangeAspect="1"/>
+          </p:cNvPicPr>
+          <p:nvPr>
+            <p:ph idx="1"/>
+          </p:nvPr>
+        </p:nvPicPr>
+        <p:blipFill>
+          <a:blip r:embed="rId2">
+            <a:extLst>
+              <a:ext uri="{28A0092B-C50C-407E-A947-70E740481C1C}">
+                <a14:useLocalDpi xmlns:a14="http://schemas.microsoft.com/office/drawing/2010/main" val="0"/>
+              </a:ext>
+            </a:extLst>
+          </a:blip>
+          <a:stretch>
+            <a:fillRect/>
+          </a:stretch>
+        </p:blipFill>
+        <p:spPr>
+          <a:xfrm>
+            <a:off x="3192695" y="1825625"/>
+            <a:ext cx="5806610" cy="4351338"/>
+          </a:xfrm>
+        </p:spPr>
+      </p:pic>
     </p:spTree>
     <p:extLst>
       <p:ext uri="{BB962C8B-B14F-4D97-AF65-F5344CB8AC3E}">
-        <p14:creationId xmlns:p14="http://schemas.microsoft.com/office/powerpoint/2010/main" val="1388197831"/>
+        <p14:creationId xmlns:p14="http://schemas.microsoft.com/office/powerpoint/2010/main" val="3067687759"/>
       </p:ext>
     </p:extLst>
   </p:cSld>
@@ -4024,29 +4063,9 @@
           <a:lstStyle/>
           <a:p>
             <a:r>
-              <a:rPr lang="de-DE" dirty="0" smtClean="0"/>
-              <a:t>Ausblick</a:t>
-            </a:r>
-            <a:endParaRPr lang="de-DE" dirty="0"/>
-          </a:p>
-        </p:txBody>
-      </p:sp>
-      <p:sp>
-        <p:nvSpPr>
-          <p:cNvPr id="3" name="Inhaltsplatzhalter 2"/>
-          <p:cNvSpPr>
-            <a:spLocks noGrp="1"/>
-          </p:cNvSpPr>
-          <p:nvPr>
-            <p:ph idx="1"/>
-          </p:nvPr>
-        </p:nvSpPr>
-        <p:spPr/>
-        <p:txBody>
-          <a:bodyPr/>
-          <a:lstStyle/>
-          <a:p>
-            <a:endParaRPr lang="de-DE"/>
+              <a:rPr lang="de-DE" dirty="0"/>
+              <a:t>View</a:t>
+            </a:r>
           </a:p>
         </p:txBody>
       </p:sp>
@@ -4073,10 +4092,45 @@
           </a:p>
         </p:txBody>
       </p:sp>
+      <p:pic>
+        <p:nvPicPr>
+          <p:cNvPr id="20" name="Inhaltsplatzhalter 19">
+            <a:extLst>
+              <a:ext uri="{FF2B5EF4-FFF2-40B4-BE49-F238E27FC236}">
+                <a16:creationId xmlns:a16="http://schemas.microsoft.com/office/drawing/2014/main" id="{B29F2282-5A96-4FA3-B8E2-5F6DE3EC7FEF}"/>
+              </a:ext>
+            </a:extLst>
+          </p:cNvPr>
+          <p:cNvPicPr>
+            <a:picLocks noGrp="1" noChangeAspect="1"/>
+          </p:cNvPicPr>
+          <p:nvPr>
+            <p:ph idx="1"/>
+          </p:nvPr>
+        </p:nvPicPr>
+        <p:blipFill>
+          <a:blip r:embed="rId2">
+            <a:extLst>
+              <a:ext uri="{28A0092B-C50C-407E-A947-70E740481C1C}">
+                <a14:useLocalDpi xmlns:a14="http://schemas.microsoft.com/office/drawing/2010/main" val="0"/>
+              </a:ext>
+            </a:extLst>
+          </a:blip>
+          <a:stretch>
+            <a:fillRect/>
+          </a:stretch>
+        </p:blipFill>
+        <p:spPr>
+          <a:xfrm>
+            <a:off x="3192695" y="1825625"/>
+            <a:ext cx="5806610" cy="4351338"/>
+          </a:xfrm>
+        </p:spPr>
+      </p:pic>
     </p:spTree>
     <p:extLst>
       <p:ext uri="{BB962C8B-B14F-4D97-AF65-F5344CB8AC3E}">
-        <p14:creationId xmlns:p14="http://schemas.microsoft.com/office/powerpoint/2010/main" val="2027448438"/>
+        <p14:creationId xmlns:p14="http://schemas.microsoft.com/office/powerpoint/2010/main" val="1699182696"/>
       </p:ext>
     </p:extLst>
   </p:cSld>
@@ -4119,29 +4173,9 @@
           <a:lstStyle/>
           <a:p>
             <a:r>
-              <a:rPr lang="de-DE" dirty="0" smtClean="0"/>
-              <a:t>Fazit</a:t>
-            </a:r>
-            <a:endParaRPr lang="de-DE" dirty="0"/>
-          </a:p>
-        </p:txBody>
-      </p:sp>
-      <p:sp>
-        <p:nvSpPr>
-          <p:cNvPr id="3" name="Inhaltsplatzhalter 2"/>
-          <p:cNvSpPr>
-            <a:spLocks noGrp="1"/>
-          </p:cNvSpPr>
-          <p:nvPr>
-            <p:ph idx="1"/>
-          </p:nvPr>
-        </p:nvSpPr>
-        <p:spPr/>
-        <p:txBody>
-          <a:bodyPr/>
-          <a:lstStyle/>
-          <a:p>
-            <a:endParaRPr lang="de-DE"/>
+              <a:rPr lang="de-DE" dirty="0"/>
+              <a:t>Button Darstellung</a:t>
+            </a:r>
           </a:p>
         </p:txBody>
       </p:sp>
@@ -4168,10 +4202,255 @@
           </a:p>
         </p:txBody>
       </p:sp>
+      <p:pic>
+        <p:nvPicPr>
+          <p:cNvPr id="9" name="Inhaltsplatzhalter 8">
+            <a:extLst>
+              <a:ext uri="{FF2B5EF4-FFF2-40B4-BE49-F238E27FC236}">
+                <a16:creationId xmlns:a16="http://schemas.microsoft.com/office/drawing/2014/main" id="{F0FBF428-F1CF-4E45-8648-4008C91C5376}"/>
+              </a:ext>
+            </a:extLst>
+          </p:cNvPr>
+          <p:cNvPicPr>
+            <a:picLocks noGrp="1" noChangeAspect="1"/>
+          </p:cNvPicPr>
+          <p:nvPr>
+            <p:ph idx="1"/>
+          </p:nvPr>
+        </p:nvPicPr>
+        <p:blipFill>
+          <a:blip r:embed="rId2">
+            <a:extLst>
+              <a:ext uri="{28A0092B-C50C-407E-A947-70E740481C1C}">
+                <a14:useLocalDpi xmlns:a14="http://schemas.microsoft.com/office/drawing/2010/main" val="0"/>
+              </a:ext>
+            </a:extLst>
+          </a:blip>
+          <a:stretch>
+            <a:fillRect/>
+          </a:stretch>
+        </p:blipFill>
+        <p:spPr>
+          <a:xfrm>
+            <a:off x="1076274" y="1825625"/>
+            <a:ext cx="10039451" cy="4351338"/>
+          </a:xfrm>
+        </p:spPr>
+      </p:pic>
     </p:spTree>
     <p:extLst>
       <p:ext uri="{BB962C8B-B14F-4D97-AF65-F5344CB8AC3E}">
-        <p14:creationId xmlns:p14="http://schemas.microsoft.com/office/powerpoint/2010/main" val="810013215"/>
+        <p14:creationId xmlns:p14="http://schemas.microsoft.com/office/powerpoint/2010/main" val="1360122823"/>
+      </p:ext>
+    </p:extLst>
+  </p:cSld>
+  <p:clrMapOvr>
+    <a:masterClrMapping/>
+  </p:clrMapOvr>
+</p:sld>
+</file>
+
+<file path=ppt/slides/slide18.xml><?xml version="1.0" encoding="utf-8"?>
+<p:sld xmlns:a="http://schemas.openxmlformats.org/drawingml/2006/main" xmlns:r="http://schemas.openxmlformats.org/officeDocument/2006/relationships" xmlns:p="http://schemas.openxmlformats.org/presentationml/2006/main">
+  <p:cSld>
+    <p:spTree>
+      <p:nvGrpSpPr>
+        <p:cNvPr id="1" name=""/>
+        <p:cNvGrpSpPr/>
+        <p:nvPr/>
+      </p:nvGrpSpPr>
+      <p:grpSpPr>
+        <a:xfrm>
+          <a:off x="0" y="0"/>
+          <a:ext cx="0" cy="0"/>
+          <a:chOff x="0" y="0"/>
+          <a:chExt cx="0" cy="0"/>
+        </a:xfrm>
+      </p:grpSpPr>
+      <p:sp>
+        <p:nvSpPr>
+          <p:cNvPr id="2" name="Titel 1"/>
+          <p:cNvSpPr>
+            <a:spLocks noGrp="1"/>
+          </p:cNvSpPr>
+          <p:nvPr>
+            <p:ph type="title"/>
+          </p:nvPr>
+        </p:nvSpPr>
+        <p:spPr/>
+        <p:txBody>
+          <a:bodyPr/>
+          <a:lstStyle/>
+          <a:p>
+            <a:r>
+              <a:rPr lang="de-DE" dirty="0"/>
+              <a:t>Button Darstellung</a:t>
+            </a:r>
+          </a:p>
+        </p:txBody>
+      </p:sp>
+      <p:sp>
+        <p:nvSpPr>
+          <p:cNvPr id="6" name="Foliennummernplatzhalter 5"/>
+          <p:cNvSpPr>
+            <a:spLocks noGrp="1"/>
+          </p:cNvSpPr>
+          <p:nvPr>
+            <p:ph type="sldNum" sz="quarter" idx="12"/>
+          </p:nvPr>
+        </p:nvSpPr>
+        <p:spPr/>
+        <p:txBody>
+          <a:bodyPr/>
+          <a:lstStyle/>
+          <a:p>
+            <a:fld id="{57D8F98F-9146-4D48-BD84-43508DAD44DB}" type="slidenum">
+              <a:rPr lang="de-DE" smtClean="0"/>
+              <a:t>18</a:t>
+            </a:fld>
+            <a:endParaRPr lang="de-DE"/>
+          </a:p>
+        </p:txBody>
+      </p:sp>
+      <p:pic>
+        <p:nvPicPr>
+          <p:cNvPr id="7" name="Inhaltsplatzhalter 6">
+            <a:extLst>
+              <a:ext uri="{FF2B5EF4-FFF2-40B4-BE49-F238E27FC236}">
+                <a16:creationId xmlns:a16="http://schemas.microsoft.com/office/drawing/2014/main" id="{461DAFE3-3C3B-4EB6-BB45-75D45CD9EA1A}"/>
+              </a:ext>
+            </a:extLst>
+          </p:cNvPr>
+          <p:cNvPicPr>
+            <a:picLocks noGrp="1" noChangeAspect="1"/>
+          </p:cNvPicPr>
+          <p:nvPr>
+            <p:ph idx="1"/>
+          </p:nvPr>
+        </p:nvPicPr>
+        <p:blipFill>
+          <a:blip r:embed="rId2">
+            <a:extLst>
+              <a:ext uri="{28A0092B-C50C-407E-A947-70E740481C1C}">
+                <a14:useLocalDpi xmlns:a14="http://schemas.microsoft.com/office/drawing/2010/main" val="0"/>
+              </a:ext>
+            </a:extLst>
+          </a:blip>
+          <a:stretch>
+            <a:fillRect/>
+          </a:stretch>
+        </p:blipFill>
+        <p:spPr>
+          <a:xfrm>
+            <a:off x="3685343" y="1825625"/>
+            <a:ext cx="4821314" cy="4351338"/>
+          </a:xfrm>
+        </p:spPr>
+      </p:pic>
+    </p:spTree>
+    <p:extLst>
+      <p:ext uri="{BB962C8B-B14F-4D97-AF65-F5344CB8AC3E}">
+        <p14:creationId xmlns:p14="http://schemas.microsoft.com/office/powerpoint/2010/main" val="2981509911"/>
+      </p:ext>
+    </p:extLst>
+  </p:cSld>
+  <p:clrMapOvr>
+    <a:masterClrMapping/>
+  </p:clrMapOvr>
+</p:sld>
+</file>
+
+<file path=ppt/slides/slide19.xml><?xml version="1.0" encoding="utf-8"?>
+<p:sld xmlns:a="http://schemas.openxmlformats.org/drawingml/2006/main" xmlns:r="http://schemas.openxmlformats.org/officeDocument/2006/relationships" xmlns:p="http://schemas.openxmlformats.org/presentationml/2006/main">
+  <p:cSld>
+    <p:spTree>
+      <p:nvGrpSpPr>
+        <p:cNvPr id="1" name=""/>
+        <p:cNvGrpSpPr/>
+        <p:nvPr/>
+      </p:nvGrpSpPr>
+      <p:grpSpPr>
+        <a:xfrm>
+          <a:off x="0" y="0"/>
+          <a:ext cx="0" cy="0"/>
+          <a:chOff x="0" y="0"/>
+          <a:chExt cx="0" cy="0"/>
+        </a:xfrm>
+      </p:grpSpPr>
+      <p:sp>
+        <p:nvSpPr>
+          <p:cNvPr id="2" name="Titel 1"/>
+          <p:cNvSpPr>
+            <a:spLocks noGrp="1"/>
+          </p:cNvSpPr>
+          <p:nvPr>
+            <p:ph type="title"/>
+          </p:nvPr>
+        </p:nvSpPr>
+        <p:spPr/>
+        <p:txBody>
+          <a:bodyPr/>
+          <a:lstStyle/>
+          <a:p>
+            <a:r>
+              <a:rPr lang="de-DE" dirty="0"/>
+              <a:t>Was Funktioniert?</a:t>
+            </a:r>
+          </a:p>
+        </p:txBody>
+      </p:sp>
+      <p:sp>
+        <p:nvSpPr>
+          <p:cNvPr id="6" name="Foliennummernplatzhalter 5"/>
+          <p:cNvSpPr>
+            <a:spLocks noGrp="1"/>
+          </p:cNvSpPr>
+          <p:nvPr>
+            <p:ph type="sldNum" sz="quarter" idx="12"/>
+          </p:nvPr>
+        </p:nvSpPr>
+        <p:spPr/>
+        <p:txBody>
+          <a:bodyPr/>
+          <a:lstStyle/>
+          <a:p>
+            <a:fld id="{57D8F98F-9146-4D48-BD84-43508DAD44DB}" type="slidenum">
+              <a:rPr lang="de-DE" smtClean="0"/>
+              <a:t>19</a:t>
+            </a:fld>
+            <a:endParaRPr lang="de-DE"/>
+          </a:p>
+        </p:txBody>
+      </p:sp>
+      <p:sp>
+        <p:nvSpPr>
+          <p:cNvPr id="8" name="Inhaltsplatzhalter 7">
+            <a:extLst>
+              <a:ext uri="{FF2B5EF4-FFF2-40B4-BE49-F238E27FC236}">
+                <a16:creationId xmlns:a16="http://schemas.microsoft.com/office/drawing/2014/main" id="{F041C424-7738-49F5-887D-C36C6CF91708}"/>
+              </a:ext>
+            </a:extLst>
+          </p:cNvPr>
+          <p:cNvSpPr>
+            <a:spLocks noGrp="1"/>
+          </p:cNvSpPr>
+          <p:nvPr>
+            <p:ph idx="1"/>
+          </p:nvPr>
+        </p:nvSpPr>
+        <p:spPr/>
+        <p:txBody>
+          <a:bodyPr/>
+          <a:lstStyle/>
+          <a:p>
+            <a:endParaRPr lang="de-DE"/>
+          </a:p>
+        </p:txBody>
+      </p:sp>
+    </p:spTree>
+    <p:extLst>
+      <p:ext uri="{BB962C8B-B14F-4D97-AF65-F5344CB8AC3E}">
+        <p14:creationId xmlns:p14="http://schemas.microsoft.com/office/powerpoint/2010/main" val="1388197831"/>
       </p:ext>
     </p:extLst>
   </p:cSld>
@@ -4214,10 +4493,9 @@
           <a:lstStyle/>
           <a:p>
             <a:r>
-              <a:rPr lang="de-DE" dirty="0" smtClean="0"/>
+              <a:rPr lang="de-DE" dirty="0"/>
               <a:t>Inhalt</a:t>
             </a:r>
-            <a:endParaRPr lang="de-DE" dirty="0"/>
           </a:p>
         </p:txBody>
       </p:sp>
@@ -4239,61 +4517,61 @@
           <a:lstStyle/>
           <a:p>
             <a:r>
-              <a:rPr lang="de-DE" dirty="0" smtClean="0"/>
+              <a:rPr lang="de-DE" dirty="0"/>
               <a:t>Auftrag/Problemstellung</a:t>
             </a:r>
           </a:p>
           <a:p>
             <a:r>
-              <a:rPr lang="de-DE" dirty="0" smtClean="0"/>
+              <a:rPr lang="de-DE" dirty="0"/>
               <a:t>Lösungsidee</a:t>
             </a:r>
           </a:p>
           <a:p>
             <a:r>
-              <a:rPr lang="de-DE" dirty="0" smtClean="0"/>
+              <a:rPr lang="de-DE" dirty="0"/>
               <a:t>Zeitplan</a:t>
             </a:r>
           </a:p>
           <a:p>
             <a:r>
-              <a:rPr lang="de-DE" dirty="0" smtClean="0"/>
+              <a:rPr lang="de-DE" dirty="0"/>
               <a:t>MVC</a:t>
             </a:r>
           </a:p>
           <a:p>
             <a:r>
-              <a:rPr lang="de-DE" dirty="0" smtClean="0"/>
+              <a:rPr lang="de-DE" dirty="0"/>
               <a:t>Ist-Zustand</a:t>
             </a:r>
           </a:p>
           <a:p>
             <a:r>
-              <a:rPr lang="de-DE" dirty="0" smtClean="0"/>
+              <a:rPr lang="de-DE" dirty="0"/>
               <a:t>Demonstration</a:t>
             </a:r>
           </a:p>
           <a:p>
             <a:r>
-              <a:rPr lang="de-DE" dirty="0" smtClean="0"/>
+              <a:rPr lang="de-DE" dirty="0"/>
               <a:t>Model</a:t>
             </a:r>
           </a:p>
           <a:p>
             <a:r>
-              <a:rPr lang="de-DE" dirty="0" smtClean="0"/>
+              <a:rPr lang="de-DE" dirty="0"/>
               <a:t>Controller</a:t>
             </a:r>
           </a:p>
           <a:p>
             <a:r>
-              <a:rPr lang="de-DE" dirty="0" smtClean="0"/>
+              <a:rPr lang="de-DE" dirty="0"/>
               <a:t>View</a:t>
             </a:r>
           </a:p>
           <a:p>
             <a:r>
-              <a:rPr lang="de-DE" dirty="0" smtClean="0"/>
+              <a:rPr lang="de-DE" dirty="0"/>
               <a:t>Fazit</a:t>
             </a:r>
           </a:p>
@@ -4326,6 +4604,194 @@
     <p:extLst>
       <p:ext uri="{BB962C8B-B14F-4D97-AF65-F5344CB8AC3E}">
         <p14:creationId xmlns:p14="http://schemas.microsoft.com/office/powerpoint/2010/main" val="2672888852"/>
+      </p:ext>
+    </p:extLst>
+  </p:cSld>
+  <p:clrMapOvr>
+    <a:masterClrMapping/>
+  </p:clrMapOvr>
+</p:sld>
+</file>
+
+<file path=ppt/slides/slide20.xml><?xml version="1.0" encoding="utf-8"?>
+<p:sld xmlns:a="http://schemas.openxmlformats.org/drawingml/2006/main" xmlns:r="http://schemas.openxmlformats.org/officeDocument/2006/relationships" xmlns:p="http://schemas.openxmlformats.org/presentationml/2006/main">
+  <p:cSld>
+    <p:spTree>
+      <p:nvGrpSpPr>
+        <p:cNvPr id="1" name=""/>
+        <p:cNvGrpSpPr/>
+        <p:nvPr/>
+      </p:nvGrpSpPr>
+      <p:grpSpPr>
+        <a:xfrm>
+          <a:off x="0" y="0"/>
+          <a:ext cx="0" cy="0"/>
+          <a:chOff x="0" y="0"/>
+          <a:chExt cx="0" cy="0"/>
+        </a:xfrm>
+      </p:grpSpPr>
+      <p:sp>
+        <p:nvSpPr>
+          <p:cNvPr id="2" name="Titel 1"/>
+          <p:cNvSpPr>
+            <a:spLocks noGrp="1"/>
+          </p:cNvSpPr>
+          <p:nvPr>
+            <p:ph type="title"/>
+          </p:nvPr>
+        </p:nvSpPr>
+        <p:spPr/>
+        <p:txBody>
+          <a:bodyPr/>
+          <a:lstStyle/>
+          <a:p>
+            <a:r>
+              <a:rPr lang="de-DE" dirty="0"/>
+              <a:t>Ausblick</a:t>
+            </a:r>
+          </a:p>
+        </p:txBody>
+      </p:sp>
+      <p:sp>
+        <p:nvSpPr>
+          <p:cNvPr id="3" name="Inhaltsplatzhalter 2"/>
+          <p:cNvSpPr>
+            <a:spLocks noGrp="1"/>
+          </p:cNvSpPr>
+          <p:nvPr>
+            <p:ph idx="1"/>
+          </p:nvPr>
+        </p:nvSpPr>
+        <p:spPr/>
+        <p:txBody>
+          <a:bodyPr/>
+          <a:lstStyle/>
+          <a:p>
+            <a:endParaRPr lang="de-DE"/>
+          </a:p>
+        </p:txBody>
+      </p:sp>
+      <p:sp>
+        <p:nvSpPr>
+          <p:cNvPr id="6" name="Foliennummernplatzhalter 5"/>
+          <p:cNvSpPr>
+            <a:spLocks noGrp="1"/>
+          </p:cNvSpPr>
+          <p:nvPr>
+            <p:ph type="sldNum" sz="quarter" idx="12"/>
+          </p:nvPr>
+        </p:nvSpPr>
+        <p:spPr/>
+        <p:txBody>
+          <a:bodyPr/>
+          <a:lstStyle/>
+          <a:p>
+            <a:fld id="{57D8F98F-9146-4D48-BD84-43508DAD44DB}" type="slidenum">
+              <a:rPr lang="de-DE" smtClean="0"/>
+              <a:t>20</a:t>
+            </a:fld>
+            <a:endParaRPr lang="de-DE"/>
+          </a:p>
+        </p:txBody>
+      </p:sp>
+    </p:spTree>
+    <p:extLst>
+      <p:ext uri="{BB962C8B-B14F-4D97-AF65-F5344CB8AC3E}">
+        <p14:creationId xmlns:p14="http://schemas.microsoft.com/office/powerpoint/2010/main" val="2027448438"/>
+      </p:ext>
+    </p:extLst>
+  </p:cSld>
+  <p:clrMapOvr>
+    <a:masterClrMapping/>
+  </p:clrMapOvr>
+</p:sld>
+</file>
+
+<file path=ppt/slides/slide21.xml><?xml version="1.0" encoding="utf-8"?>
+<p:sld xmlns:a="http://schemas.openxmlformats.org/drawingml/2006/main" xmlns:r="http://schemas.openxmlformats.org/officeDocument/2006/relationships" xmlns:p="http://schemas.openxmlformats.org/presentationml/2006/main">
+  <p:cSld>
+    <p:spTree>
+      <p:nvGrpSpPr>
+        <p:cNvPr id="1" name=""/>
+        <p:cNvGrpSpPr/>
+        <p:nvPr/>
+      </p:nvGrpSpPr>
+      <p:grpSpPr>
+        <a:xfrm>
+          <a:off x="0" y="0"/>
+          <a:ext cx="0" cy="0"/>
+          <a:chOff x="0" y="0"/>
+          <a:chExt cx="0" cy="0"/>
+        </a:xfrm>
+      </p:grpSpPr>
+      <p:sp>
+        <p:nvSpPr>
+          <p:cNvPr id="2" name="Titel 1"/>
+          <p:cNvSpPr>
+            <a:spLocks noGrp="1"/>
+          </p:cNvSpPr>
+          <p:nvPr>
+            <p:ph type="title"/>
+          </p:nvPr>
+        </p:nvSpPr>
+        <p:spPr/>
+        <p:txBody>
+          <a:bodyPr/>
+          <a:lstStyle/>
+          <a:p>
+            <a:r>
+              <a:rPr lang="de-DE" dirty="0"/>
+              <a:t>Fazit</a:t>
+            </a:r>
+          </a:p>
+        </p:txBody>
+      </p:sp>
+      <p:sp>
+        <p:nvSpPr>
+          <p:cNvPr id="3" name="Inhaltsplatzhalter 2"/>
+          <p:cNvSpPr>
+            <a:spLocks noGrp="1"/>
+          </p:cNvSpPr>
+          <p:nvPr>
+            <p:ph idx="1"/>
+          </p:nvPr>
+        </p:nvSpPr>
+        <p:spPr/>
+        <p:txBody>
+          <a:bodyPr/>
+          <a:lstStyle/>
+          <a:p>
+            <a:endParaRPr lang="de-DE"/>
+          </a:p>
+        </p:txBody>
+      </p:sp>
+      <p:sp>
+        <p:nvSpPr>
+          <p:cNvPr id="6" name="Foliennummernplatzhalter 5"/>
+          <p:cNvSpPr>
+            <a:spLocks noGrp="1"/>
+          </p:cNvSpPr>
+          <p:nvPr>
+            <p:ph type="sldNum" sz="quarter" idx="12"/>
+          </p:nvPr>
+        </p:nvSpPr>
+        <p:spPr/>
+        <p:txBody>
+          <a:bodyPr/>
+          <a:lstStyle/>
+          <a:p>
+            <a:fld id="{57D8F98F-9146-4D48-BD84-43508DAD44DB}" type="slidenum">
+              <a:rPr lang="de-DE" smtClean="0"/>
+              <a:t>21</a:t>
+            </a:fld>
+            <a:endParaRPr lang="de-DE"/>
+          </a:p>
+        </p:txBody>
+      </p:sp>
+    </p:spTree>
+    <p:extLst>
+      <p:ext uri="{BB962C8B-B14F-4D97-AF65-F5344CB8AC3E}">
+        <p14:creationId xmlns:p14="http://schemas.microsoft.com/office/powerpoint/2010/main" val="810013215"/>
       </p:ext>
     </p:extLst>
   </p:cSld>
@@ -4368,72 +4834,71 @@
           <a:lstStyle/>
           <a:p>
             <a:r>
-              <a:rPr lang="de-DE" dirty="0" smtClean="0"/>
+              <a:rPr lang="de-DE" dirty="0"/>
               <a:t>Auftrag/Problemstellung</a:t>
             </a:r>
+          </a:p>
+        </p:txBody>
+      </p:sp>
+      <p:sp>
+        <p:nvSpPr>
+          <p:cNvPr id="3" name="Inhaltsplatzhalter 2"/>
+          <p:cNvSpPr>
+            <a:spLocks noGrp="1"/>
+          </p:cNvSpPr>
+          <p:nvPr>
+            <p:ph idx="1"/>
+          </p:nvPr>
+        </p:nvSpPr>
+        <p:spPr/>
+        <p:txBody>
+          <a:bodyPr/>
+          <a:lstStyle/>
+          <a:p>
+            <a:r>
+              <a:rPr lang="de-DE" dirty="0"/>
+              <a:t>Programmieren des Spiels „Wer wird Millionär“</a:t>
+            </a:r>
+          </a:p>
+          <a:p>
+            <a:r>
+              <a:rPr lang="de-DE" dirty="0" err="1"/>
+              <a:t>Qt-Entwicklunsumgebung</a:t>
+            </a:r>
             <a:endParaRPr lang="de-DE" dirty="0"/>
           </a:p>
-        </p:txBody>
-      </p:sp>
-      <p:sp>
-        <p:nvSpPr>
-          <p:cNvPr id="3" name="Inhaltsplatzhalter 2"/>
-          <p:cNvSpPr>
-            <a:spLocks noGrp="1"/>
-          </p:cNvSpPr>
-          <p:nvPr>
-            <p:ph idx="1"/>
-          </p:nvPr>
-        </p:nvSpPr>
-        <p:spPr/>
-        <p:txBody>
-          <a:bodyPr/>
-          <a:lstStyle/>
-          <a:p>
-            <a:r>
-              <a:rPr lang="de-DE" dirty="0" smtClean="0"/>
-              <a:t>Programmieren des Spiels „Wer wird Millionär“</a:t>
-            </a:r>
-          </a:p>
-          <a:p>
-            <a:r>
-              <a:rPr lang="de-DE" dirty="0" err="1" smtClean="0"/>
-              <a:t>Qt-Entwicklunsumgebung</a:t>
+          <a:p>
+            <a:r>
+              <a:rPr lang="de-DE" dirty="0" err="1"/>
+              <a:t>Qt-Gui</a:t>
             </a:r>
             <a:endParaRPr lang="de-DE" dirty="0"/>
           </a:p>
           <a:p>
             <a:r>
-              <a:rPr lang="de-DE" dirty="0" err="1" smtClean="0"/>
-              <a:t>Qt-Gui</a:t>
-            </a:r>
-            <a:endParaRPr lang="de-DE" dirty="0" smtClean="0"/>
-          </a:p>
-          <a:p>
-            <a:r>
-              <a:rPr lang="de-DE" dirty="0" smtClean="0"/>
+              <a:rPr lang="de-DE" dirty="0"/>
               <a:t>C++</a:t>
             </a:r>
           </a:p>
           <a:p>
             <a:r>
-              <a:rPr lang="de-DE" dirty="0" smtClean="0"/>
+              <a:rPr lang="de-DE" dirty="0"/>
               <a:t>Original Spielregeln</a:t>
             </a:r>
           </a:p>
           <a:p>
             <a:r>
-              <a:rPr lang="de-DE" dirty="0" smtClean="0"/>
+              <a:rPr lang="de-DE" dirty="0"/>
               <a:t>Grafiken und Bilder wie im Original</a:t>
             </a:r>
           </a:p>
           <a:p>
             <a:r>
-              <a:rPr lang="de-DE" dirty="0" smtClean="0"/>
+              <a:rPr lang="de-DE" dirty="0"/>
               <a:t>Fragenkatalog </a:t>
             </a:r>
             <a:r>
-              <a:rPr lang="de-DE" dirty="0" smtClean="0">
+              <a:rPr lang="de-DE" dirty="0">
                 <a:sym typeface="Wingdings" panose="05000000000000000000" pitchFamily="2" charset="2"/>
               </a:rPr>
               <a:t> Datenbank</a:t>
@@ -4511,10 +4976,9 @@
           <a:lstStyle/>
           <a:p>
             <a:r>
-              <a:rPr lang="de-DE" dirty="0" smtClean="0"/>
+              <a:rPr lang="de-DE" dirty="0"/>
               <a:t>Zeitplan</a:t>
             </a:r>
-            <a:endParaRPr lang="de-DE" dirty="0"/>
           </a:p>
         </p:txBody>
       </p:sp>
@@ -4596,10 +5060,9 @@
                     <a:lstStyle/>
                     <a:p>
                       <a:r>
-                        <a:rPr lang="de-DE" dirty="0" smtClean="0"/>
+                        <a:rPr lang="de-DE" dirty="0"/>
                         <a:t>Task</a:t>
                       </a:r>
-                      <a:endParaRPr lang="de-DE" dirty="0"/>
                     </a:p>
                   </a:txBody>
                   <a:tcPr/>
@@ -4610,18 +5073,17 @@
                     <a:lstStyle/>
                     <a:p>
                       <a:r>
-                        <a:rPr lang="en-US" noProof="0" dirty="0" smtClean="0"/>
+                        <a:rPr lang="en-US" noProof="0" dirty="0"/>
                         <a:t>Assigned</a:t>
                       </a:r>
                       <a:r>
-                        <a:rPr lang="de-DE" dirty="0" smtClean="0"/>
+                        <a:rPr lang="de-DE" dirty="0"/>
                         <a:t> </a:t>
                       </a:r>
                       <a:r>
-                        <a:rPr lang="en-US" noProof="0" dirty="0" smtClean="0"/>
+                        <a:rPr lang="en-US" noProof="0" dirty="0"/>
                         <a:t>to</a:t>
                       </a:r>
-                      <a:endParaRPr lang="en-US" noProof="0" dirty="0"/>
                     </a:p>
                   </a:txBody>
                   <a:tcPr/>
@@ -4632,10 +5094,9 @@
                     <a:lstStyle/>
                     <a:p>
                       <a:r>
-                        <a:rPr lang="en-US" noProof="0" dirty="0" smtClean="0"/>
+                        <a:rPr lang="en-US" noProof="0" dirty="0"/>
                         <a:t>Time</a:t>
                       </a:r>
-                      <a:endParaRPr lang="en-US" noProof="0" dirty="0"/>
                     </a:p>
                   </a:txBody>
                   <a:tcPr/>
@@ -4653,11 +5114,11 @@
                     <a:lstStyle/>
                     <a:p>
                       <a:r>
-                        <a:rPr lang="de-DE" dirty="0" smtClean="0"/>
+                        <a:rPr lang="de-DE" dirty="0"/>
                         <a:t>Orientierung,</a:t>
                       </a:r>
                       <a:r>
-                        <a:rPr lang="de-DE" baseline="0" dirty="0" smtClean="0"/>
+                        <a:rPr lang="de-DE" baseline="0" dirty="0"/>
                         <a:t> Planung </a:t>
                       </a:r>
                       <a:endParaRPr lang="de-DE" dirty="0"/>
@@ -4671,10 +5132,9 @@
                     <a:lstStyle/>
                     <a:p>
                       <a:r>
-                        <a:rPr lang="de-DE" dirty="0" smtClean="0"/>
+                        <a:rPr lang="de-DE" dirty="0"/>
                         <a:t>alle</a:t>
                       </a:r>
-                      <a:endParaRPr lang="de-DE" dirty="0"/>
                     </a:p>
                   </a:txBody>
                   <a:tcPr/>
@@ -4685,10 +5145,9 @@
                     <a:lstStyle/>
                     <a:p>
                       <a:r>
-                        <a:rPr lang="de-DE" dirty="0" smtClean="0"/>
+                        <a:rPr lang="de-DE" dirty="0"/>
                         <a:t>1</a:t>
                       </a:r>
-                      <a:endParaRPr lang="de-DE" dirty="0"/>
                     </a:p>
                   </a:txBody>
                   <a:tcPr/>
@@ -4706,11 +5165,11 @@
                     <a:lstStyle/>
                     <a:p>
                       <a:r>
-                        <a:rPr lang="de-DE" dirty="0" smtClean="0"/>
+                        <a:rPr lang="de-DE" dirty="0"/>
                         <a:t>Details der Umsetzung</a:t>
                       </a:r>
                       <a:r>
-                        <a:rPr lang="de-DE" baseline="0" dirty="0" smtClean="0"/>
+                        <a:rPr lang="de-DE" baseline="0" dirty="0"/>
                         <a:t> entscheiden</a:t>
                       </a:r>
                       <a:endParaRPr lang="de-DE" dirty="0"/>
@@ -4724,10 +5183,9 @@
                     <a:lstStyle/>
                     <a:p>
                       <a:r>
-                        <a:rPr lang="de-DE" dirty="0" smtClean="0"/>
+                        <a:rPr lang="de-DE" dirty="0"/>
                         <a:t>alle</a:t>
                       </a:r>
-                      <a:endParaRPr lang="de-DE" dirty="0"/>
                     </a:p>
                   </a:txBody>
                   <a:tcPr/>
@@ -4738,10 +5196,9 @@
                     <a:lstStyle/>
                     <a:p>
                       <a:r>
-                        <a:rPr lang="de-DE" dirty="0" smtClean="0"/>
+                        <a:rPr lang="de-DE" dirty="0"/>
                         <a:t>1</a:t>
                       </a:r>
-                      <a:endParaRPr lang="de-DE" dirty="0"/>
                     </a:p>
                   </a:txBody>
                   <a:tcPr/>
@@ -4759,10 +5216,9 @@
                     <a:lstStyle/>
                     <a:p>
                       <a:r>
-                        <a:rPr lang="de-DE" dirty="0" smtClean="0"/>
+                        <a:rPr lang="de-DE" dirty="0"/>
                         <a:t>Besprechung MVC Prinzip</a:t>
                       </a:r>
-                      <a:endParaRPr lang="de-DE" dirty="0"/>
                     </a:p>
                   </a:txBody>
                   <a:tcPr/>
@@ -4773,10 +5229,9 @@
                     <a:lstStyle/>
                     <a:p>
                       <a:r>
-                        <a:rPr lang="de-DE" dirty="0" smtClean="0"/>
+                        <a:rPr lang="de-DE" dirty="0"/>
                         <a:t>alle</a:t>
                       </a:r>
-                      <a:endParaRPr lang="de-DE" dirty="0"/>
                     </a:p>
                   </a:txBody>
                   <a:tcPr/>
@@ -4787,10 +5242,9 @@
                     <a:lstStyle/>
                     <a:p>
                       <a:r>
-                        <a:rPr lang="de-DE" dirty="0" smtClean="0"/>
+                        <a:rPr lang="de-DE" dirty="0"/>
                         <a:t>3</a:t>
                       </a:r>
-                      <a:endParaRPr lang="de-DE" dirty="0"/>
                     </a:p>
                   </a:txBody>
                   <a:tcPr/>
@@ -4808,7 +5262,7 @@
                     <a:lstStyle/>
                     <a:p>
                       <a:r>
-                        <a:rPr lang="de-DE" dirty="0" err="1" smtClean="0"/>
+                        <a:rPr lang="de-DE" dirty="0" err="1"/>
                         <a:t>Klasssendiagramme</a:t>
                       </a:r>
                       <a:endParaRPr lang="de-DE" dirty="0"/>
@@ -4822,10 +5276,9 @@
                     <a:lstStyle/>
                     <a:p>
                       <a:r>
-                        <a:rPr lang="de-DE" dirty="0" smtClean="0"/>
+                        <a:rPr lang="de-DE" dirty="0"/>
                         <a:t>alle</a:t>
                       </a:r>
-                      <a:endParaRPr lang="de-DE" dirty="0"/>
                     </a:p>
                   </a:txBody>
                   <a:tcPr/>
@@ -4836,10 +5289,9 @@
                     <a:lstStyle/>
                     <a:p>
                       <a:r>
-                        <a:rPr lang="de-DE" dirty="0" smtClean="0"/>
+                        <a:rPr lang="de-DE" dirty="0"/>
                         <a:t>2</a:t>
                       </a:r>
-                      <a:endParaRPr lang="de-DE" dirty="0"/>
                     </a:p>
                   </a:txBody>
                   <a:tcPr/>
@@ -4857,11 +5309,11 @@
                     <a:lstStyle/>
                     <a:p>
                       <a:r>
-                        <a:rPr lang="de-DE" dirty="0" smtClean="0"/>
+                        <a:rPr lang="de-DE" dirty="0"/>
                         <a:t>Implementierung</a:t>
                       </a:r>
                       <a:r>
-                        <a:rPr lang="de-DE" baseline="0" dirty="0" smtClean="0"/>
+                        <a:rPr lang="de-DE" baseline="0" dirty="0"/>
                         <a:t> Model</a:t>
                       </a:r>
                       <a:endParaRPr lang="de-DE" dirty="0"/>
@@ -4875,10 +5327,9 @@
                     <a:lstStyle/>
                     <a:p>
                       <a:r>
-                        <a:rPr lang="de-DE" dirty="0" smtClean="0"/>
+                        <a:rPr lang="de-DE" dirty="0"/>
                         <a:t>Christoph</a:t>
                       </a:r>
-                      <a:endParaRPr lang="de-DE" dirty="0"/>
                     </a:p>
                   </a:txBody>
                   <a:tcPr/>
@@ -4889,10 +5340,9 @@
                     <a:lstStyle/>
                     <a:p>
                       <a:r>
-                        <a:rPr lang="de-DE" dirty="0" smtClean="0"/>
+                        <a:rPr lang="de-DE" dirty="0"/>
                         <a:t>6</a:t>
                       </a:r>
-                      <a:endParaRPr lang="de-DE" dirty="0"/>
                     </a:p>
                   </a:txBody>
                   <a:tcPr/>
@@ -4910,11 +5360,11 @@
                     <a:lstStyle/>
                     <a:p>
                       <a:r>
-                        <a:rPr lang="de-DE" dirty="0" smtClean="0"/>
+                        <a:rPr lang="de-DE" dirty="0"/>
                         <a:t>Implementierung</a:t>
                       </a:r>
                       <a:r>
-                        <a:rPr lang="de-DE" baseline="0" dirty="0" smtClean="0"/>
+                        <a:rPr lang="de-DE" baseline="0" dirty="0"/>
                         <a:t> Controller</a:t>
                       </a:r>
                       <a:endParaRPr lang="de-DE" dirty="0"/>
@@ -4928,10 +5378,9 @@
                     <a:lstStyle/>
                     <a:p>
                       <a:r>
-                        <a:rPr lang="de-DE" dirty="0" smtClean="0"/>
+                        <a:rPr lang="de-DE" dirty="0"/>
                         <a:t>Mark</a:t>
                       </a:r>
-                      <a:endParaRPr lang="de-DE" dirty="0"/>
                     </a:p>
                   </a:txBody>
                   <a:tcPr/>
@@ -4942,10 +5391,9 @@
                     <a:lstStyle/>
                     <a:p>
                       <a:r>
-                        <a:rPr lang="de-DE" dirty="0" smtClean="0"/>
+                        <a:rPr lang="de-DE" dirty="0"/>
                         <a:t>6</a:t>
                       </a:r>
-                      <a:endParaRPr lang="de-DE" dirty="0"/>
                     </a:p>
                   </a:txBody>
                   <a:tcPr/>
@@ -4963,11 +5411,11 @@
                     <a:lstStyle/>
                     <a:p>
                       <a:r>
-                        <a:rPr lang="de-DE" dirty="0" smtClean="0"/>
+                        <a:rPr lang="de-DE" dirty="0"/>
                         <a:t>Implementierung</a:t>
                       </a:r>
                       <a:r>
-                        <a:rPr lang="de-DE" baseline="0" dirty="0" smtClean="0"/>
+                        <a:rPr lang="de-DE" baseline="0" dirty="0"/>
                         <a:t> View</a:t>
                       </a:r>
                       <a:endParaRPr lang="de-DE" dirty="0"/>
@@ -4981,10 +5429,9 @@
                     <a:lstStyle/>
                     <a:p>
                       <a:r>
-                        <a:rPr lang="de-DE" dirty="0" smtClean="0"/>
+                        <a:rPr lang="de-DE" dirty="0"/>
                         <a:t>Jan</a:t>
                       </a:r>
-                      <a:endParaRPr lang="de-DE" dirty="0"/>
                     </a:p>
                   </a:txBody>
                   <a:tcPr/>
@@ -4995,10 +5442,9 @@
                     <a:lstStyle/>
                     <a:p>
                       <a:r>
-                        <a:rPr lang="de-DE" dirty="0" smtClean="0"/>
+                        <a:rPr lang="de-DE" dirty="0"/>
                         <a:t>6</a:t>
                       </a:r>
-                      <a:endParaRPr lang="de-DE" dirty="0"/>
                     </a:p>
                   </a:txBody>
                   <a:tcPr/>
@@ -5016,10 +5462,9 @@
                     <a:lstStyle/>
                     <a:p>
                       <a:r>
-                        <a:rPr lang="de-DE" dirty="0" smtClean="0"/>
+                        <a:rPr lang="de-DE" dirty="0"/>
                         <a:t>Zusammenfügen</a:t>
                       </a:r>
-                      <a:endParaRPr lang="de-DE" dirty="0"/>
                     </a:p>
                   </a:txBody>
                   <a:tcPr/>
@@ -5030,10 +5475,9 @@
                     <a:lstStyle/>
                     <a:p>
                       <a:r>
-                        <a:rPr lang="de-DE" dirty="0" smtClean="0"/>
+                        <a:rPr lang="de-DE" dirty="0"/>
                         <a:t>alle</a:t>
                       </a:r>
-                      <a:endParaRPr lang="de-DE" dirty="0"/>
                     </a:p>
                   </a:txBody>
                   <a:tcPr/>
@@ -5044,10 +5488,9 @@
                     <a:lstStyle/>
                     <a:p>
                       <a:r>
-                        <a:rPr lang="de-DE" dirty="0" smtClean="0"/>
+                        <a:rPr lang="de-DE" dirty="0"/>
                         <a:t>2</a:t>
                       </a:r>
-                      <a:endParaRPr lang="de-DE" dirty="0"/>
                     </a:p>
                   </a:txBody>
                   <a:tcPr/>
@@ -5065,7 +5508,7 @@
                     <a:lstStyle/>
                     <a:p>
                       <a:r>
-                        <a:rPr lang="de-DE" dirty="0" err="1" smtClean="0"/>
+                        <a:rPr lang="de-DE" dirty="0" err="1"/>
                         <a:t>Refactoring</a:t>
                       </a:r>
                       <a:endParaRPr lang="de-DE" dirty="0"/>
@@ -5079,10 +5522,9 @@
                     <a:lstStyle/>
                     <a:p>
                       <a:r>
-                        <a:rPr lang="de-DE" dirty="0" smtClean="0"/>
+                        <a:rPr lang="de-DE" dirty="0"/>
                         <a:t>alle</a:t>
                       </a:r>
-                      <a:endParaRPr lang="de-DE" dirty="0"/>
                     </a:p>
                   </a:txBody>
                   <a:tcPr/>
@@ -5093,10 +5535,9 @@
                     <a:lstStyle/>
                     <a:p>
                       <a:r>
-                        <a:rPr lang="de-DE" dirty="0" smtClean="0"/>
+                        <a:rPr lang="de-DE" dirty="0"/>
                         <a:t>1</a:t>
                       </a:r>
-                      <a:endParaRPr lang="de-DE" dirty="0"/>
                     </a:p>
                   </a:txBody>
                   <a:tcPr/>
@@ -5231,10 +5672,9 @@
           <a:lstStyle/>
           <a:p>
             <a:r>
-              <a:rPr lang="de-DE" dirty="0" smtClean="0"/>
+              <a:rPr lang="de-DE" dirty="0"/>
               <a:t>MVC (Techn. Plan)</a:t>
             </a:r>
-            <a:endParaRPr lang="de-DE" dirty="0"/>
           </a:p>
         </p:txBody>
       </p:sp>
@@ -5326,63 +5766,61 @@
           <a:lstStyle/>
           <a:p>
             <a:r>
-              <a:rPr lang="de-DE" dirty="0" smtClean="0"/>
+              <a:rPr lang="de-DE" dirty="0"/>
               <a:t>Lösungsansatz</a:t>
             </a:r>
             <a:br>
-              <a:rPr lang="de-DE" dirty="0" smtClean="0"/>
+              <a:rPr lang="de-DE" dirty="0"/>
             </a:br>
             <a:r>
-              <a:rPr lang="de-DE" dirty="0" smtClean="0"/>
+              <a:rPr lang="de-DE" dirty="0"/>
               <a:t>Ist Zustand</a:t>
             </a:r>
+          </a:p>
+        </p:txBody>
+      </p:sp>
+      <p:sp>
+        <p:nvSpPr>
+          <p:cNvPr id="3" name="Inhaltsplatzhalter 2"/>
+          <p:cNvSpPr>
+            <a:spLocks noGrp="1"/>
+          </p:cNvSpPr>
+          <p:nvPr>
+            <p:ph idx="1"/>
+          </p:nvPr>
+        </p:nvSpPr>
+        <p:spPr/>
+        <p:txBody>
+          <a:bodyPr/>
+          <a:lstStyle/>
+          <a:p>
+            <a:r>
+              <a:rPr lang="de-DE" dirty="0"/>
+              <a:t>Für MVC Pattern entschieden.</a:t>
+            </a:r>
+          </a:p>
+          <a:p>
+            <a:r>
+              <a:rPr lang="de-DE" dirty="0"/>
+              <a:t>Model hält Spielstand</a:t>
+            </a:r>
+          </a:p>
+          <a:p>
+            <a:r>
+              <a:rPr lang="de-DE" dirty="0"/>
+              <a:t>Controller </a:t>
+            </a:r>
+            <a:r>
+              <a:rPr lang="de-DE" dirty="0" err="1"/>
+              <a:t>kk</a:t>
+            </a:r>
             <a:endParaRPr lang="de-DE" dirty="0"/>
           </a:p>
-        </p:txBody>
-      </p:sp>
-      <p:sp>
-        <p:nvSpPr>
-          <p:cNvPr id="3" name="Inhaltsplatzhalter 2"/>
-          <p:cNvSpPr>
-            <a:spLocks noGrp="1"/>
-          </p:cNvSpPr>
-          <p:nvPr>
-            <p:ph idx="1"/>
-          </p:nvPr>
-        </p:nvSpPr>
-        <p:spPr/>
-        <p:txBody>
-          <a:bodyPr/>
-          <a:lstStyle/>
-          <a:p>
-            <a:r>
-              <a:rPr lang="de-DE" dirty="0" smtClean="0"/>
-              <a:t>Für MVC Pattern entschieden.</a:t>
-            </a:r>
-          </a:p>
-          <a:p>
-            <a:r>
-              <a:rPr lang="de-DE" dirty="0" smtClean="0"/>
-              <a:t>Model hält Spielstand</a:t>
-            </a:r>
-          </a:p>
-          <a:p>
-            <a:r>
-              <a:rPr lang="de-DE" dirty="0" smtClean="0"/>
-              <a:t>Controller </a:t>
-            </a:r>
-            <a:r>
-              <a:rPr lang="de-DE" dirty="0" err="1" smtClean="0"/>
-              <a:t>kk</a:t>
-            </a:r>
-            <a:endParaRPr lang="de-DE" dirty="0" smtClean="0"/>
-          </a:p>
-          <a:p>
-            <a:r>
-              <a:rPr lang="de-DE" dirty="0" smtClean="0"/>
+          <a:p>
+            <a:r>
+              <a:rPr lang="de-DE" dirty="0"/>
               <a:t>GUI soll skalierbar sein</a:t>
             </a:r>
-            <a:endParaRPr lang="de-DE" dirty="0"/>
           </a:p>
         </p:txBody>
       </p:sp>
@@ -5456,13 +5894,8 @@
           <a:p>
             <a:r>
               <a:rPr lang="de-DE" dirty="0"/>
-              <a:t>D</a:t>
-            </a:r>
-            <a:r>
-              <a:rPr lang="de-DE" dirty="0" smtClean="0"/>
-              <a:t>emonstration</a:t>
-            </a:r>
-            <a:endParaRPr lang="de-DE" dirty="0"/>
+              <a:t>Demonstration</a:t>
+            </a:r>
           </a:p>
         </p:txBody>
       </p:sp>
@@ -5554,10 +5987,9 @@
           <a:lstStyle/>
           <a:p>
             <a:r>
-              <a:rPr lang="de-DE" dirty="0" smtClean="0"/>
+              <a:rPr lang="de-DE" dirty="0"/>
               <a:t>Model</a:t>
             </a:r>
-            <a:endParaRPr lang="de-DE" dirty="0"/>
           </a:p>
         </p:txBody>
       </p:sp>
@@ -5649,14 +6081,9 @@
           <a:lstStyle/>
           <a:p>
             <a:r>
-              <a:rPr lang="de-DE" dirty="0" smtClean="0"/>
-              <a:t>Was </a:t>
-            </a:r>
-            <a:r>
-              <a:rPr lang="de-DE" dirty="0" smtClean="0"/>
-              <a:t>Funktioniert?</a:t>
-            </a:r>
-            <a:endParaRPr lang="de-DE" dirty="0"/>
+              <a:rPr lang="de-DE" dirty="0"/>
+              <a:t>Was Funktioniert?</a:t>
+            </a:r>
           </a:p>
         </p:txBody>
       </p:sp>

</xml_diff>